<commit_message>
Clean up res folder
</commit_message>
<xml_diff>
--- a/res/LogoDesign.pptx
+++ b/res/LogoDesign.pptx
@@ -259,7 +259,7 @@
           <a:p>
             <a:fld id="{24E48754-7FB4-B446-B37F-5F5C71A9E81F}" type="datetimeFigureOut">
               <a:rPr lang="en-US" smtClean="0"/>
-              <a:t>1/19/21</a:t>
+              <a:t>3/4/21</a:t>
             </a:fld>
             <a:endParaRPr lang="en-US"/>
           </a:p>
@@ -457,7 +457,7 @@
           <a:p>
             <a:fld id="{24E48754-7FB4-B446-B37F-5F5C71A9E81F}" type="datetimeFigureOut">
               <a:rPr lang="en-US" smtClean="0"/>
-              <a:t>1/19/21</a:t>
+              <a:t>3/4/21</a:t>
             </a:fld>
             <a:endParaRPr lang="en-US"/>
           </a:p>
@@ -665,7 +665,7 @@
           <a:p>
             <a:fld id="{24E48754-7FB4-B446-B37F-5F5C71A9E81F}" type="datetimeFigureOut">
               <a:rPr lang="en-US" smtClean="0"/>
-              <a:t>1/19/21</a:t>
+              <a:t>3/4/21</a:t>
             </a:fld>
             <a:endParaRPr lang="en-US"/>
           </a:p>
@@ -863,7 +863,7 @@
           <a:p>
             <a:fld id="{24E48754-7FB4-B446-B37F-5F5C71A9E81F}" type="datetimeFigureOut">
               <a:rPr lang="en-US" smtClean="0"/>
-              <a:t>1/19/21</a:t>
+              <a:t>3/4/21</a:t>
             </a:fld>
             <a:endParaRPr lang="en-US"/>
           </a:p>
@@ -1138,7 +1138,7 @@
           <a:p>
             <a:fld id="{24E48754-7FB4-B446-B37F-5F5C71A9E81F}" type="datetimeFigureOut">
               <a:rPr lang="en-US" smtClean="0"/>
-              <a:t>1/19/21</a:t>
+              <a:t>3/4/21</a:t>
             </a:fld>
             <a:endParaRPr lang="en-US"/>
           </a:p>
@@ -1403,7 +1403,7 @@
           <a:p>
             <a:fld id="{24E48754-7FB4-B446-B37F-5F5C71A9E81F}" type="datetimeFigureOut">
               <a:rPr lang="en-US" smtClean="0"/>
-              <a:t>1/19/21</a:t>
+              <a:t>3/4/21</a:t>
             </a:fld>
             <a:endParaRPr lang="en-US"/>
           </a:p>
@@ -1815,7 +1815,7 @@
           <a:p>
             <a:fld id="{24E48754-7FB4-B446-B37F-5F5C71A9E81F}" type="datetimeFigureOut">
               <a:rPr lang="en-US" smtClean="0"/>
-              <a:t>1/19/21</a:t>
+              <a:t>3/4/21</a:t>
             </a:fld>
             <a:endParaRPr lang="en-US"/>
           </a:p>
@@ -1956,7 +1956,7 @@
           <a:p>
             <a:fld id="{24E48754-7FB4-B446-B37F-5F5C71A9E81F}" type="datetimeFigureOut">
               <a:rPr lang="en-US" smtClean="0"/>
-              <a:t>1/19/21</a:t>
+              <a:t>3/4/21</a:t>
             </a:fld>
             <a:endParaRPr lang="en-US"/>
           </a:p>
@@ -2069,7 +2069,7 @@
           <a:p>
             <a:fld id="{24E48754-7FB4-B446-B37F-5F5C71A9E81F}" type="datetimeFigureOut">
               <a:rPr lang="en-US" smtClean="0"/>
-              <a:t>1/19/21</a:t>
+              <a:t>3/4/21</a:t>
             </a:fld>
             <a:endParaRPr lang="en-US"/>
           </a:p>
@@ -2380,7 +2380,7 @@
           <a:p>
             <a:fld id="{24E48754-7FB4-B446-B37F-5F5C71A9E81F}" type="datetimeFigureOut">
               <a:rPr lang="en-US" smtClean="0"/>
-              <a:t>1/19/21</a:t>
+              <a:t>3/4/21</a:t>
             </a:fld>
             <a:endParaRPr lang="en-US"/>
           </a:p>
@@ -2668,7 +2668,7 @@
           <a:p>
             <a:fld id="{24E48754-7FB4-B446-B37F-5F5C71A9E81F}" type="datetimeFigureOut">
               <a:rPr lang="en-US" smtClean="0"/>
-              <a:t>1/19/21</a:t>
+              <a:t>3/4/21</a:t>
             </a:fld>
             <a:endParaRPr lang="en-US"/>
           </a:p>
@@ -2909,7 +2909,7 @@
           <a:p>
             <a:fld id="{24E48754-7FB4-B446-B37F-5F5C71A9E81F}" type="datetimeFigureOut">
               <a:rPr lang="en-US" smtClean="0"/>
-              <a:t>1/19/21</a:t>
+              <a:t>3/4/21</a:t>
             </a:fld>
             <a:endParaRPr lang="en-US"/>
           </a:p>
@@ -3380,10 +3380,10 @@
       </p:sp>
       <p:grpSp>
         <p:nvGrpSpPr>
-          <p:cNvPr id="4" name="Group 3">
-            <a:extLst>
-              <a:ext uri="{FF2B5EF4-FFF2-40B4-BE49-F238E27FC236}">
-                <a16:creationId xmlns:a16="http://schemas.microsoft.com/office/drawing/2014/main" id="{41E96EC7-E046-7146-AB55-A671B28ACF3C}"/>
+          <p:cNvPr id="7" name="Group 6">
+            <a:extLst>
+              <a:ext uri="{FF2B5EF4-FFF2-40B4-BE49-F238E27FC236}">
+                <a16:creationId xmlns:a16="http://schemas.microsoft.com/office/drawing/2014/main" id="{3FF135E3-F128-2743-9C37-721F4C20994B}"/>
               </a:ext>
             </a:extLst>
           </p:cNvPr>
@@ -3392,10 +3392,10 @@
         </p:nvGrpSpPr>
         <p:grpSpPr>
           <a:xfrm>
-            <a:off x="3792515" y="207712"/>
-            <a:ext cx="4606970" cy="1598725"/>
-            <a:chOff x="3793834" y="207712"/>
-            <a:chExt cx="4606970" cy="1598725"/>
+            <a:off x="809166" y="160873"/>
+            <a:ext cx="10573667" cy="1692403"/>
+            <a:chOff x="283029" y="160873"/>
+            <a:chExt cx="10573667" cy="1692403"/>
           </a:xfrm>
         </p:grpSpPr>
         <p:sp>
@@ -3412,8 +3412,8 @@
           </p:nvSpPr>
           <p:spPr>
             <a:xfrm>
-              <a:off x="5382029" y="405724"/>
-              <a:ext cx="3018775" cy="1323439"/>
+              <a:off x="2923499" y="405724"/>
+              <a:ext cx="7933197" cy="1323439"/>
             </a:xfrm>
             <a:prstGeom prst="rect">
               <a:avLst/>
@@ -3435,130 +3435,54 @@
                   <a:ea typeface="Lato" panose="020F0502020204030203" pitchFamily="34" charset="0"/>
                   <a:cs typeface="Lato" panose="020F0502020204030203" pitchFamily="34" charset="0"/>
                 </a:rPr>
-                <a:t>MSpray</a:t>
+                <a:t>Goldstone Meetings</a:t>
               </a:r>
             </a:p>
           </p:txBody>
         </p:sp>
-        <p:grpSp>
-          <p:nvGrpSpPr>
-            <p:cNvPr id="3" name="Group 2">
+        <p:pic>
+          <p:nvPicPr>
+            <p:cNvPr id="5" name="Picture 4" descr="Icon&#10;&#10;Description automatically generated">
               <a:extLst>
                 <a:ext uri="{FF2B5EF4-FFF2-40B4-BE49-F238E27FC236}">
-                  <a16:creationId xmlns:a16="http://schemas.microsoft.com/office/drawing/2014/main" id="{43551DE1-E603-FA44-983E-76268E3EBDC6}"/>
+                  <a16:creationId xmlns:a16="http://schemas.microsoft.com/office/drawing/2014/main" id="{570459B5-D5F7-DF43-8DAD-3AB5BBA4AF35}"/>
                 </a:ext>
               </a:extLst>
             </p:cNvPr>
-            <p:cNvGrpSpPr/>
+            <p:cNvPicPr>
+              <a:picLocks noChangeAspect="1"/>
+            </p:cNvPicPr>
             <p:nvPr/>
-          </p:nvGrpSpPr>
-          <p:grpSpPr>
+          </p:nvPicPr>
+          <p:blipFill rotWithShape="1">
+            <a:blip r:embed="rId2">
+              <a:extLst>
+                <a:ext uri="{BEBA8EAE-BF5A-486C-A8C5-ECC9F3942E4B}">
+                  <a14:imgProps xmlns:a14="http://schemas.microsoft.com/office/drawing/2010/main">
+                    <a14:imgLayer r:embed="rId3">
+                      <a14:imgEffect>
+                        <a14:backgroundRemoval t="9615" b="89941" l="10000" r="90000">
+                          <a14:foregroundMark x1="50431" y1="9615" x2="50431" y2="12574"/>
+                        </a14:backgroundRemoval>
+                      </a14:imgEffect>
+                    </a14:imgLayer>
+                  </a14:imgProps>
+                </a:ext>
+              </a:extLst>
+            </a:blip>
+            <a:srcRect l="16182" r="15401" b="24751"/>
+            <a:stretch/>
+          </p:blipFill>
+          <p:spPr>
             <a:xfrm>
-              <a:off x="3793834" y="207712"/>
-              <a:ext cx="1629470" cy="1598725"/>
-              <a:chOff x="3765259" y="210887"/>
-              <a:chExt cx="1629470" cy="1598725"/>
+              <a:off x="283029" y="160873"/>
+              <a:ext cx="2640470" cy="1692403"/>
             </a:xfrm>
-          </p:grpSpPr>
-          <p:pic>
-            <p:nvPicPr>
-              <p:cNvPr id="12" name="Picture 11" descr="Icon&#10;&#10;Description automatically generated">
-                <a:extLst>
-                  <a:ext uri="{FF2B5EF4-FFF2-40B4-BE49-F238E27FC236}">
-                    <a16:creationId xmlns:a16="http://schemas.microsoft.com/office/drawing/2014/main" id="{02069663-2D32-C64A-8D28-E9D3DDD1A807}"/>
-                  </a:ext>
-                </a:extLst>
-              </p:cNvPr>
-              <p:cNvPicPr>
-                <a:picLocks noChangeAspect="1"/>
-              </p:cNvPicPr>
-              <p:nvPr/>
-            </p:nvPicPr>
-            <p:blipFill>
-              <a:blip r:embed="rId2">
-                <a:extLst>
-                  <a:ext uri="{BEBA8EAE-BF5A-486C-A8C5-ECC9F3942E4B}">
-                    <a14:imgProps xmlns:a14="http://schemas.microsoft.com/office/drawing/2010/main">
-                      <a14:imgLayer r:embed="rId3">
-                        <a14:imgEffect>
-                          <a14:backgroundRemoval t="2710" b="96241" l="4117" r="95026">
-                            <a14:foregroundMark x1="13808" y1="20192" x2="15352" y2="17570"/>
-                            <a14:foregroundMark x1="16123" y1="18619" x2="22556" y2="12413"/>
-                            <a14:foregroundMark x1="28473" y1="8654" x2="52230" y2="2710"/>
-                            <a14:foregroundMark x1="91767" y1="31469" x2="95111" y2="38462"/>
-                            <a14:foregroundMark x1="7376" y1="32867" x2="4117" y2="42657"/>
-                            <a14:foregroundMark x1="27873" y1="91084" x2="33276" y2="92832"/>
-                            <a14:foregroundMark x1="62350" y1="94056" x2="54974" y2="96241"/>
-                            <a14:backgroundMark x1="20669" y1="44231" x2="55746" y2="45105"/>
-                            <a14:backgroundMark x1="55746" y1="45105" x2="78473" y2="45017"/>
-                            <a14:backgroundMark x1="22213" y1="42657" x2="22213" y2="65822"/>
-                          </a14:backgroundRemoval>
-                        </a14:imgEffect>
-                      </a14:imgLayer>
-                    </a14:imgProps>
-                  </a:ext>
-                </a:extLst>
-              </a:blip>
-              <a:stretch>
-                <a:fillRect/>
-              </a:stretch>
-            </p:blipFill>
-            <p:spPr>
-              <a:xfrm>
-                <a:off x="3765259" y="210887"/>
-                <a:ext cx="1629470" cy="1598725"/>
-              </a:xfrm>
-              <a:prstGeom prst="rect">
-                <a:avLst/>
-              </a:prstGeom>
-            </p:spPr>
-          </p:pic>
-          <p:pic>
-            <p:nvPicPr>
-              <p:cNvPr id="6" name="Picture 5" descr="Icon&#10;&#10;Description automatically generated">
-                <a:extLst>
-                  <a:ext uri="{FF2B5EF4-FFF2-40B4-BE49-F238E27FC236}">
-                    <a16:creationId xmlns:a16="http://schemas.microsoft.com/office/drawing/2014/main" id="{A0D261E7-B06E-3E4C-8D93-E7890A2EFFEC}"/>
-                  </a:ext>
-                </a:extLst>
-              </p:cNvPr>
-              <p:cNvPicPr>
-                <a:picLocks noChangeAspect="1"/>
-              </p:cNvPicPr>
-              <p:nvPr/>
-            </p:nvPicPr>
-            <p:blipFill rotWithShape="1">
-              <a:blip r:embed="rId4">
-                <a:extLst>
-                  <a:ext uri="{BEBA8EAE-BF5A-486C-A8C5-ECC9F3942E4B}">
-                    <a14:imgProps xmlns:a14="http://schemas.microsoft.com/office/drawing/2010/main">
-                      <a14:imgLayer r:embed="rId5">
-                        <a14:imgEffect>
-                          <a14:backgroundRemoval t="10000" b="90000" l="10000" r="90000">
-                            <a14:foregroundMark x1="40223" y1="54371" x2="44340" y2="55944"/>
-                            <a14:foregroundMark x1="73156" y1="36888" x2="73585" y2="35839"/>
-                            <a14:foregroundMark x1="58405" y1="68444" x2="56003" y2="68619"/>
-                          </a14:backgroundRemoval>
-                        </a14:imgEffect>
-                      </a14:imgLayer>
-                    </a14:imgProps>
-                  </a:ext>
-                </a:extLst>
-              </a:blip>
-              <a:srcRect l="17911" t="26528" r="19738" b="27795"/>
-              <a:stretch/>
-            </p:blipFill>
-            <p:spPr>
-              <a:xfrm>
-                <a:off x="4083050" y="631825"/>
-                <a:ext cx="1016000" cy="730250"/>
-              </a:xfrm>
-              <a:prstGeom prst="rect">
-                <a:avLst/>
-              </a:prstGeom>
-            </p:spPr>
-          </p:pic>
-        </p:grpSp>
+            <a:prstGeom prst="rect">
+              <a:avLst/>
+            </a:prstGeom>
+          </p:spPr>
+        </p:pic>
       </p:grpSp>
     </p:spTree>
     <p:extLst>

</xml_diff>